<commit_message>
lab for keras intro done
</commit_message>
<xml_diff>
--- a/day1/Introduction to Keras - Part 2.pptx
+++ b/day1/Introduction to Keras - Part 2.pptx
@@ -721,7 +721,7 @@
           <a:p>
             <a:fld id="{01A33273-803F-DA43-96F2-E36DF0A1E10C}" type="datetimeFigureOut">
               <a:rPr lang="en-US" smtClean="0"/>
-              <a:t>5/10/18</a:t>
+              <a:t>5/11/18</a:t>
             </a:fld>
             <a:endParaRPr lang="en-US"/>
           </a:p>
@@ -919,7 +919,7 @@
           <a:p>
             <a:fld id="{01A33273-803F-DA43-96F2-E36DF0A1E10C}" type="datetimeFigureOut">
               <a:rPr lang="en-US" smtClean="0"/>
-              <a:t>5/10/18</a:t>
+              <a:t>5/11/18</a:t>
             </a:fld>
             <a:endParaRPr lang="en-US"/>
           </a:p>
@@ -1127,7 +1127,7 @@
           <a:p>
             <a:fld id="{01A33273-803F-DA43-96F2-E36DF0A1E10C}" type="datetimeFigureOut">
               <a:rPr lang="en-US" smtClean="0"/>
-              <a:t>5/10/18</a:t>
+              <a:t>5/11/18</a:t>
             </a:fld>
             <a:endParaRPr lang="en-US"/>
           </a:p>
@@ -1325,7 +1325,7 @@
           <a:p>
             <a:fld id="{01A33273-803F-DA43-96F2-E36DF0A1E10C}" type="datetimeFigureOut">
               <a:rPr lang="en-US" smtClean="0"/>
-              <a:t>5/10/18</a:t>
+              <a:t>5/11/18</a:t>
             </a:fld>
             <a:endParaRPr lang="en-US"/>
           </a:p>
@@ -1600,7 +1600,7 @@
           <a:p>
             <a:fld id="{01A33273-803F-DA43-96F2-E36DF0A1E10C}" type="datetimeFigureOut">
               <a:rPr lang="en-US" smtClean="0"/>
-              <a:t>5/10/18</a:t>
+              <a:t>5/11/18</a:t>
             </a:fld>
             <a:endParaRPr lang="en-US"/>
           </a:p>
@@ -1865,7 +1865,7 @@
           <a:p>
             <a:fld id="{01A33273-803F-DA43-96F2-E36DF0A1E10C}" type="datetimeFigureOut">
               <a:rPr lang="en-US" smtClean="0"/>
-              <a:t>5/10/18</a:t>
+              <a:t>5/11/18</a:t>
             </a:fld>
             <a:endParaRPr lang="en-US"/>
           </a:p>
@@ -2277,7 +2277,7 @@
           <a:p>
             <a:fld id="{01A33273-803F-DA43-96F2-E36DF0A1E10C}" type="datetimeFigureOut">
               <a:rPr lang="en-US" smtClean="0"/>
-              <a:t>5/10/18</a:t>
+              <a:t>5/11/18</a:t>
             </a:fld>
             <a:endParaRPr lang="en-US"/>
           </a:p>
@@ -2418,7 +2418,7 @@
           <a:p>
             <a:fld id="{01A33273-803F-DA43-96F2-E36DF0A1E10C}" type="datetimeFigureOut">
               <a:rPr lang="en-US" smtClean="0"/>
-              <a:t>5/10/18</a:t>
+              <a:t>5/11/18</a:t>
             </a:fld>
             <a:endParaRPr lang="en-US"/>
           </a:p>
@@ -2531,7 +2531,7 @@
           <a:p>
             <a:fld id="{01A33273-803F-DA43-96F2-E36DF0A1E10C}" type="datetimeFigureOut">
               <a:rPr lang="en-US" smtClean="0"/>
-              <a:t>5/10/18</a:t>
+              <a:t>5/11/18</a:t>
             </a:fld>
             <a:endParaRPr lang="en-US"/>
           </a:p>
@@ -2842,7 +2842,7 @@
           <a:p>
             <a:fld id="{01A33273-803F-DA43-96F2-E36DF0A1E10C}" type="datetimeFigureOut">
               <a:rPr lang="en-US" smtClean="0"/>
-              <a:t>5/10/18</a:t>
+              <a:t>5/11/18</a:t>
             </a:fld>
             <a:endParaRPr lang="en-US"/>
           </a:p>
@@ -3130,7 +3130,7 @@
           <a:p>
             <a:fld id="{01A33273-803F-DA43-96F2-E36DF0A1E10C}" type="datetimeFigureOut">
               <a:rPr lang="en-US" smtClean="0"/>
-              <a:t>5/10/18</a:t>
+              <a:t>5/11/18</a:t>
             </a:fld>
             <a:endParaRPr lang="en-US"/>
           </a:p>
@@ -3371,7 +3371,7 @@
           <a:p>
             <a:fld id="{01A33273-803F-DA43-96F2-E36DF0A1E10C}" type="datetimeFigureOut">
               <a:rPr lang="en-US" smtClean="0"/>
-              <a:t>5/10/18</a:t>
+              <a:t>5/11/18</a:t>
             </a:fld>
             <a:endParaRPr lang="en-US"/>
           </a:p>
@@ -4074,7 +4074,7 @@
             <a:pPr lvl="1"/>
             <a:r>
               <a:rPr lang="en-US" dirty="0" err="1"/>
-              <a:t>Model_checkpoint</a:t>
+              <a:t>ModelCheckpoint</a:t>
             </a:r>
             <a:r>
               <a:rPr lang="en-US" dirty="0"/>
@@ -4167,7 +4167,7 @@
         <p:spPr>
           <a:xfrm>
             <a:off x="1014761" y="1828800"/>
-            <a:ext cx="10604810" cy="2585323"/>
+            <a:ext cx="10604810" cy="2308324"/>
           </a:xfrm>
           <a:prstGeom prst="rect">
             <a:avLst/>
@@ -4425,30 +4425,7 @@
                 <a:latin typeface="Courier New" panose="02070309020205020404" pitchFamily="49" charset="0"/>
                 <a:cs typeface="Courier New" panose="02070309020205020404" pitchFamily="49" charset="0"/>
               </a:rPr>
-              <a:t>= 0.2, </a:t>
-            </a:r>
-          </a:p>
-          <a:p>
-            <a:r>
-              <a:rPr lang="en-US" dirty="0">
-                <a:latin typeface="Courier New" panose="02070309020205020404" pitchFamily="49" charset="0"/>
-                <a:cs typeface="Courier New" panose="02070309020205020404" pitchFamily="49" charset="0"/>
-              </a:rPr>
-              <a:t>   </a:t>
-            </a:r>
-            <a:r>
-              <a:rPr lang="en-US" dirty="0" err="1">
-                <a:latin typeface="Courier New" panose="02070309020205020404" pitchFamily="49" charset="0"/>
-                <a:cs typeface="Courier New" panose="02070309020205020404" pitchFamily="49" charset="0"/>
-              </a:rPr>
-              <a:t>show_accuracy</a:t>
-            </a:r>
-            <a:r>
-              <a:rPr lang="en-US" dirty="0">
-                <a:latin typeface="Courier New" panose="02070309020205020404" pitchFamily="49" charset="0"/>
-                <a:cs typeface="Courier New" panose="02070309020205020404" pitchFamily="49" charset="0"/>
-              </a:rPr>
-              <a:t>=True) </a:t>
+              <a:t>= 0.2) </a:t>
             </a:r>
           </a:p>
           <a:p>
@@ -5035,8 +5012,7 @@
                 <a:latin typeface="Courier New" panose="02070309020205020404" pitchFamily="49" charset="0"/>
                 <a:cs typeface="Courier New" panose="02070309020205020404" pitchFamily="49" charset="0"/>
               </a:rPr>
-              <a:t>,  - weights=</a:t>
+              <a:t>, weights=</a:t>
             </a:r>
             <a:r>
               <a:rPr lang="en-US" sz="1800" dirty="0">
@@ -5164,8 +5140,7 @@
                 <a:latin typeface="Courier New" panose="02070309020205020404" pitchFamily="49" charset="0"/>
                 <a:cs typeface="Courier New" panose="02070309020205020404" pitchFamily="49" charset="0"/>
               </a:rPr>
-              <a:t>=None,  - </a:t>
+              <a:t>=None, </a:t>
             </a:r>
             <a:r>
               <a:rPr lang="en-US" sz="1800" dirty="0" err="1">
@@ -6106,7 +6081,9 @@
         </p:nvSpPr>
         <p:spPr/>
         <p:txBody>
-          <a:bodyPr/>
+          <a:bodyPr>
+            <a:normAutofit lnSpcReduction="10000"/>
+          </a:bodyPr>
           <a:lstStyle/>
           <a:p>
             <a:r>
@@ -6191,6 +6168,12 @@
               <a:t>…</a:t>
             </a:r>
           </a:p>
+          <a:p>
+            <a:r>
+              <a:rPr lang="en-US" dirty="0"/>
+              <a:t>Specify the metrics that should be displayed and evaluated</a:t>
+            </a:r>
+          </a:p>
         </p:txBody>
       </p:sp>
       <p:sp>
@@ -6211,7 +6194,9 @@
         </p:nvSpPr>
         <p:spPr/>
         <p:txBody>
-          <a:bodyPr/>
+          <a:bodyPr>
+            <a:normAutofit lnSpcReduction="10000"/>
+          </a:bodyPr>
           <a:lstStyle/>
           <a:p>
             <a:pPr marL="0" lvl="0" indent="0">
@@ -6305,7 +6290,22 @@
                 <a:latin typeface="Courier New" panose="02070309020205020404" pitchFamily="49" charset="0"/>
                 <a:cs typeface="Courier New" panose="02070309020205020404" pitchFamily="49" charset="0"/>
               </a:rPr>
-              <a:t>’)</a:t>
+              <a:t>’,</a:t>
+            </a:r>
+          </a:p>
+          <a:p>
+            <a:pPr marL="0" lvl="0" indent="0">
+              <a:buNone/>
+            </a:pPr>
+            <a:r>
+              <a:rPr lang="en-US" sz="1800" dirty="0">
+                <a:solidFill>
+                  <a:prstClr val="black"/>
+                </a:solidFill>
+                <a:latin typeface="Courier New" panose="02070309020205020404" pitchFamily="49" charset="0"/>
+                <a:cs typeface="Courier New" panose="02070309020205020404" pitchFamily="49" charset="0"/>
+              </a:rPr>
+              <a:t>	metrics=[‘accuracy’])</a:t>
             </a:r>
           </a:p>
           <a:p>

</xml_diff>

<commit_message>
Edited DNN. Added intro to cntk - part 4, and transfer learning - part 5, to go with relative labs
</commit_message>
<xml_diff>
--- a/day1/Introduction to Keras - Part 2.pptx
+++ b/day1/Introduction to Keras - Part 2.pptx
@@ -5,7 +5,7 @@
     <p:sldMasterId id="2147483648" r:id="rId1"/>
   </p:sldMasterIdLst>
   <p:notesMasterIdLst>
-    <p:notesMasterId r:id="rId14"/>
+    <p:notesMasterId r:id="rId15"/>
   </p:notesMasterIdLst>
   <p:sldIdLst>
     <p:sldId id="256" r:id="rId2"/>
@@ -20,6 +20,7 @@
     <p:sldId id="265" r:id="rId11"/>
     <p:sldId id="266" r:id="rId12"/>
     <p:sldId id="267" r:id="rId13"/>
+    <p:sldId id="279" r:id="rId14"/>
   </p:sldIdLst>
   <p:sldSz cx="12192000" cy="6858000"/>
   <p:notesSz cx="6858000" cy="9144000"/>
@@ -565,6 +566,93 @@
     <p:extLst>
       <p:ext uri="{BB962C8B-B14F-4D97-AF65-F5344CB8AC3E}">
         <p14:creationId xmlns:p14="http://schemas.microsoft.com/office/powerpoint/2010/main" val="4197984977"/>
+      </p:ext>
+    </p:extLst>
+  </p:cSld>
+  <p:clrMapOvr>
+    <a:masterClrMapping/>
+  </p:clrMapOvr>
+</p:notes>
+</file>
+
+<file path=ppt/notesSlides/notesSlide2.xml><?xml version="1.0" encoding="utf-8"?>
+<p:notes xmlns:a="http://schemas.openxmlformats.org/drawingml/2006/main" xmlns:r="http://schemas.openxmlformats.org/officeDocument/2006/relationships" xmlns:p="http://schemas.openxmlformats.org/presentationml/2006/main">
+  <p:cSld>
+    <p:spTree>
+      <p:nvGrpSpPr>
+        <p:cNvPr id="1" name=""/>
+        <p:cNvGrpSpPr/>
+        <p:nvPr/>
+      </p:nvGrpSpPr>
+      <p:grpSpPr>
+        <a:xfrm>
+          <a:off x="0" y="0"/>
+          <a:ext cx="0" cy="0"/>
+          <a:chOff x="0" y="0"/>
+          <a:chExt cx="0" cy="0"/>
+        </a:xfrm>
+      </p:grpSpPr>
+      <p:sp>
+        <p:nvSpPr>
+          <p:cNvPr id="2" name="Slide Image Placeholder 1"/>
+          <p:cNvSpPr>
+            <a:spLocks noGrp="1" noRot="1" noChangeAspect="1"/>
+          </p:cNvSpPr>
+          <p:nvPr>
+            <p:ph type="sldImg"/>
+          </p:nvPr>
+        </p:nvSpPr>
+        <p:spPr/>
+      </p:sp>
+      <p:sp>
+        <p:nvSpPr>
+          <p:cNvPr id="3" name="Notes Placeholder 2"/>
+          <p:cNvSpPr>
+            <a:spLocks noGrp="1"/>
+          </p:cNvSpPr>
+          <p:nvPr>
+            <p:ph type="body" idx="1"/>
+          </p:nvPr>
+        </p:nvSpPr>
+        <p:spPr/>
+        <p:txBody>
+          <a:bodyPr/>
+          <a:lstStyle/>
+          <a:p>
+            <a:r>
+              <a:rPr lang="en-US" dirty="0"/>
+              <a:t>Caffe is not general purpose - it focuses on computer vision. It is written in C and very fast</a:t>
+            </a:r>
+          </a:p>
+        </p:txBody>
+      </p:sp>
+      <p:sp>
+        <p:nvSpPr>
+          <p:cNvPr id="4" name="Slide Number Placeholder 3"/>
+          <p:cNvSpPr>
+            <a:spLocks noGrp="1"/>
+          </p:cNvSpPr>
+          <p:nvPr>
+            <p:ph type="sldNum" sz="quarter" idx="10"/>
+          </p:nvPr>
+        </p:nvSpPr>
+        <p:spPr/>
+        <p:txBody>
+          <a:bodyPr/>
+          <a:lstStyle/>
+          <a:p>
+            <a:fld id="{629C55F3-487F-A548-9A62-A30A51303F6D}" type="slidenum">
+              <a:rPr lang="en-US" smtClean="0"/>
+              <a:t>13</a:t>
+            </a:fld>
+            <a:endParaRPr lang="en-US"/>
+          </a:p>
+        </p:txBody>
+      </p:sp>
+    </p:spTree>
+    <p:extLst>
+      <p:ext uri="{BB962C8B-B14F-4D97-AF65-F5344CB8AC3E}">
+        <p14:creationId xmlns:p14="http://schemas.microsoft.com/office/powerpoint/2010/main" val="2641525463"/>
       </p:ext>
     </p:extLst>
   </p:cSld>
@@ -4510,6 +4598,964 @@
   <p:clrMapOvr>
     <a:masterClrMapping/>
   </p:clrMapOvr>
+</p:sld>
+</file>
+
+<file path=ppt/slides/slide13.xml><?xml version="1.0" encoding="utf-8"?>
+<p:sld xmlns:a="http://schemas.openxmlformats.org/drawingml/2006/main" xmlns:r="http://schemas.openxmlformats.org/officeDocument/2006/relationships" xmlns:p="http://schemas.openxmlformats.org/presentationml/2006/main">
+  <p:cSld>
+    <p:spTree>
+      <p:nvGrpSpPr>
+        <p:cNvPr id="1" name=""/>
+        <p:cNvGrpSpPr/>
+        <p:nvPr/>
+      </p:nvGrpSpPr>
+      <p:grpSpPr>
+        <a:xfrm>
+          <a:off x="0" y="0"/>
+          <a:ext cx="0" cy="0"/>
+          <a:chOff x="0" y="0"/>
+          <a:chExt cx="0" cy="0"/>
+        </a:xfrm>
+      </p:grpSpPr>
+      <p:sp>
+        <p:nvSpPr>
+          <p:cNvPr id="2" name="Title 1"/>
+          <p:cNvSpPr>
+            <a:spLocks noGrp="1"/>
+          </p:cNvSpPr>
+          <p:nvPr>
+            <p:ph type="title"/>
+          </p:nvPr>
+        </p:nvSpPr>
+        <p:spPr/>
+        <p:txBody>
+          <a:bodyPr/>
+          <a:lstStyle/>
+          <a:p>
+            <a:r>
+              <a:rPr lang="en-US" dirty="0"/>
+              <a:t>Deep Learning Frameworks</a:t>
+            </a:r>
+          </a:p>
+        </p:txBody>
+      </p:sp>
+      <p:graphicFrame>
+        <p:nvGraphicFramePr>
+          <p:cNvPr id="4" name="Content Placeholder 3"/>
+          <p:cNvGraphicFramePr>
+            <a:graphicFrameLocks noGrp="1"/>
+          </p:cNvGraphicFramePr>
+          <p:nvPr>
+            <p:ph idx="1"/>
+            <p:extLst>
+              <p:ext uri="{D42A27DB-BD31-4B8C-83A1-F6EECF244321}">
+                <p14:modId xmlns:p14="http://schemas.microsoft.com/office/powerpoint/2010/main" val="4223133710"/>
+              </p:ext>
+            </p:extLst>
+          </p:nvPr>
+        </p:nvGraphicFramePr>
+        <p:xfrm>
+          <a:off x="1295400" y="1622213"/>
+          <a:ext cx="9144000" cy="5227320"/>
+        </p:xfrm>
+        <a:graphic>
+          <a:graphicData uri="http://schemas.openxmlformats.org/drawingml/2006/table">
+            <a:tbl>
+              <a:tblPr firstRow="1" bandRow="1">
+                <a:tableStyleId>{8EC20E35-A176-4012-BC5E-935CFFF8708E}</a:tableStyleId>
+              </a:tblPr>
+              <a:tblGrid>
+                <a:gridCol w="2286000">
+                  <a:extLst>
+                    <a:ext uri="{9D8B030D-6E8A-4147-A177-3AD203B41FA5}">
+                      <a16:colId xmlns:a16="http://schemas.microsoft.com/office/drawing/2014/main" val="20000"/>
+                    </a:ext>
+                  </a:extLst>
+                </a:gridCol>
+                <a:gridCol w="2286000">
+                  <a:extLst>
+                    <a:ext uri="{9D8B030D-6E8A-4147-A177-3AD203B41FA5}">
+                      <a16:colId xmlns:a16="http://schemas.microsoft.com/office/drawing/2014/main" val="20001"/>
+                    </a:ext>
+                  </a:extLst>
+                </a:gridCol>
+                <a:gridCol w="2286000">
+                  <a:extLst>
+                    <a:ext uri="{9D8B030D-6E8A-4147-A177-3AD203B41FA5}">
+                      <a16:colId xmlns:a16="http://schemas.microsoft.com/office/drawing/2014/main" val="20002"/>
+                    </a:ext>
+                  </a:extLst>
+                </a:gridCol>
+                <a:gridCol w="2286000">
+                  <a:extLst>
+                    <a:ext uri="{9D8B030D-6E8A-4147-A177-3AD203B41FA5}">
+                      <a16:colId xmlns:a16="http://schemas.microsoft.com/office/drawing/2014/main" val="20003"/>
+                    </a:ext>
+                  </a:extLst>
+                </a:gridCol>
+              </a:tblGrid>
+              <a:tr h="929640">
+                <a:tc>
+                  <a:txBody>
+                    <a:bodyPr/>
+                    <a:lstStyle/>
+                    <a:p>
+                      <a:r>
+                        <a:rPr lang="en-US" dirty="0"/>
+                        <a:t>Framework</a:t>
+                      </a:r>
+                    </a:p>
+                  </a:txBody>
+                  <a:tcPr/>
+                </a:tc>
+                <a:tc>
+                  <a:txBody>
+                    <a:bodyPr/>
+                    <a:lstStyle/>
+                    <a:p>
+                      <a:r>
+                        <a:rPr lang="en-US" dirty="0"/>
+                        <a:t>Definition</a:t>
+                      </a:r>
+                    </a:p>
+                  </a:txBody>
+                  <a:tcPr/>
+                </a:tc>
+                <a:tc>
+                  <a:txBody>
+                    <a:bodyPr/>
+                    <a:lstStyle/>
+                    <a:p>
+                      <a:r>
+                        <a:rPr lang="en-US" dirty="0"/>
+                        <a:t>Sponsor</a:t>
+                      </a:r>
+                    </a:p>
+                  </a:txBody>
+                  <a:tcPr/>
+                </a:tc>
+                <a:tc>
+                  <a:txBody>
+                    <a:bodyPr/>
+                    <a:lstStyle/>
+                    <a:p>
+                      <a:r>
+                        <a:rPr lang="en-US" dirty="0"/>
+                        <a:t>Additional APIs</a:t>
+                      </a:r>
+                    </a:p>
+                  </a:txBody>
+                  <a:tcPr/>
+                </a:tc>
+                <a:extLst>
+                  <a:ext uri="{0D108BD9-81ED-4DB2-BD59-A6C34878D82A}">
+                    <a16:rowId xmlns:a16="http://schemas.microsoft.com/office/drawing/2014/main" val="10000"/>
+                  </a:ext>
+                </a:extLst>
+              </a:tr>
+              <a:tr h="777240">
+                <a:tc>
+                  <a:txBody>
+                    <a:bodyPr/>
+                    <a:lstStyle/>
+                    <a:p>
+                      <a:r>
+                        <a:rPr lang="en-US" dirty="0">
+                          <a:solidFill>
+                            <a:schemeClr val="tx1">
+                              <a:lumMod val="95000"/>
+                            </a:schemeClr>
+                          </a:solidFill>
+                          <a:hlinkClick r:id="rId3"/>
+                        </a:rPr>
+                        <a:t>CNTK</a:t>
+                      </a:r>
+                      <a:endParaRPr lang="en-US" dirty="0">
+                        <a:solidFill>
+                          <a:schemeClr val="tx1">
+                            <a:lumMod val="95000"/>
+                          </a:schemeClr>
+                        </a:solidFill>
+                      </a:endParaRPr>
+                    </a:p>
+                  </a:txBody>
+                  <a:tcPr>
+                    <a:solidFill>
+                      <a:schemeClr val="accent1">
+                        <a:alpha val="40000"/>
+                      </a:schemeClr>
+                    </a:solidFill>
+                  </a:tcPr>
+                </a:tc>
+                <a:tc>
+                  <a:txBody>
+                    <a:bodyPr/>
+                    <a:lstStyle/>
+                    <a:p>
+                      <a:r>
+                        <a:rPr lang="en-US" dirty="0">
+                          <a:solidFill>
+                            <a:schemeClr val="tx1">
+                              <a:lumMod val="95000"/>
+                            </a:schemeClr>
+                          </a:solidFill>
+                        </a:rPr>
+                        <a:t>Static Computational Graph</a:t>
+                      </a:r>
+                    </a:p>
+                  </a:txBody>
+                  <a:tcPr>
+                    <a:solidFill>
+                      <a:schemeClr val="accent1">
+                        <a:alpha val="40000"/>
+                      </a:schemeClr>
+                    </a:solidFill>
+                  </a:tcPr>
+                </a:tc>
+                <a:tc>
+                  <a:txBody>
+                    <a:bodyPr/>
+                    <a:lstStyle/>
+                    <a:p>
+                      <a:r>
+                        <a:rPr lang="en-US" dirty="0">
+                          <a:solidFill>
+                            <a:schemeClr val="tx1">
+                              <a:lumMod val="95000"/>
+                            </a:schemeClr>
+                          </a:solidFill>
+                        </a:rPr>
+                        <a:t>Microsoft</a:t>
+                      </a:r>
+                    </a:p>
+                  </a:txBody>
+                  <a:tcPr>
+                    <a:solidFill>
+                      <a:schemeClr val="accent1">
+                        <a:alpha val="40000"/>
+                      </a:schemeClr>
+                    </a:solidFill>
+                  </a:tcPr>
+                </a:tc>
+                <a:tc>
+                  <a:txBody>
+                    <a:bodyPr/>
+                    <a:lstStyle/>
+                    <a:p>
+                      <a:r>
+                        <a:rPr lang="en-US" dirty="0" err="1">
+                          <a:solidFill>
+                            <a:schemeClr val="tx1">
+                              <a:lumMod val="95000"/>
+                            </a:schemeClr>
+                          </a:solidFill>
+                        </a:rPr>
+                        <a:t>Brainscript</a:t>
+                      </a:r>
+                      <a:r>
+                        <a:rPr lang="en-US" dirty="0">
+                          <a:solidFill>
+                            <a:schemeClr val="tx1">
+                              <a:lumMod val="95000"/>
+                            </a:schemeClr>
+                          </a:solidFill>
+                        </a:rPr>
+                        <a:t>,</a:t>
+                      </a:r>
+                      <a:r>
+                        <a:rPr lang="en-US" baseline="0" dirty="0">
+                          <a:solidFill>
+                            <a:schemeClr val="tx1">
+                              <a:lumMod val="95000"/>
+                            </a:schemeClr>
+                          </a:solidFill>
+                        </a:rPr>
+                        <a:t> Python, </a:t>
+                      </a:r>
+                      <a:r>
+                        <a:rPr lang="en-US" baseline="0" dirty="0" err="1">
+                          <a:solidFill>
+                            <a:schemeClr val="tx1">
+                              <a:lumMod val="95000"/>
+                            </a:schemeClr>
+                          </a:solidFill>
+                        </a:rPr>
+                        <a:t>Keras</a:t>
+                      </a:r>
+                      <a:endParaRPr lang="en-US" dirty="0">
+                        <a:solidFill>
+                          <a:schemeClr val="tx1">
+                            <a:lumMod val="95000"/>
+                          </a:schemeClr>
+                        </a:solidFill>
+                      </a:endParaRPr>
+                    </a:p>
+                  </a:txBody>
+                  <a:tcPr>
+                    <a:solidFill>
+                      <a:schemeClr val="accent1">
+                        <a:alpha val="40000"/>
+                      </a:schemeClr>
+                    </a:solidFill>
+                  </a:tcPr>
+                </a:tc>
+                <a:extLst>
+                  <a:ext uri="{0D108BD9-81ED-4DB2-BD59-A6C34878D82A}">
+                    <a16:rowId xmlns:a16="http://schemas.microsoft.com/office/drawing/2014/main" val="10001"/>
+                  </a:ext>
+                </a:extLst>
+              </a:tr>
+              <a:tr h="777240">
+                <a:tc>
+                  <a:txBody>
+                    <a:bodyPr/>
+                    <a:lstStyle/>
+                    <a:p>
+                      <a:r>
+                        <a:rPr lang="en-US" dirty="0" err="1">
+                          <a:solidFill>
+                            <a:schemeClr val="tx1">
+                              <a:lumMod val="95000"/>
+                            </a:schemeClr>
+                          </a:solidFill>
+                          <a:hlinkClick r:id="rId4"/>
+                        </a:rPr>
+                        <a:t>TensorFlow</a:t>
+                      </a:r>
+                      <a:endParaRPr lang="en-US" dirty="0">
+                        <a:solidFill>
+                          <a:schemeClr val="tx1">
+                            <a:lumMod val="95000"/>
+                          </a:schemeClr>
+                        </a:solidFill>
+                      </a:endParaRPr>
+                    </a:p>
+                  </a:txBody>
+                  <a:tcPr>
+                    <a:solidFill>
+                      <a:schemeClr val="accent1">
+                        <a:alpha val="40000"/>
+                      </a:schemeClr>
+                    </a:solidFill>
+                  </a:tcPr>
+                </a:tc>
+                <a:tc>
+                  <a:txBody>
+                    <a:bodyPr/>
+                    <a:lstStyle/>
+                    <a:p>
+                      <a:r>
+                        <a:rPr lang="en-US" dirty="0">
+                          <a:solidFill>
+                            <a:schemeClr val="tx1">
+                              <a:lumMod val="95000"/>
+                            </a:schemeClr>
+                          </a:solidFill>
+                        </a:rPr>
+                        <a:t>Static Computational Graph</a:t>
+                      </a:r>
+                    </a:p>
+                  </a:txBody>
+                  <a:tcPr>
+                    <a:solidFill>
+                      <a:schemeClr val="accent1">
+                        <a:alpha val="40000"/>
+                      </a:schemeClr>
+                    </a:solidFill>
+                  </a:tcPr>
+                </a:tc>
+                <a:tc>
+                  <a:txBody>
+                    <a:bodyPr/>
+                    <a:lstStyle/>
+                    <a:p>
+                      <a:r>
+                        <a:rPr lang="en-US" dirty="0">
+                          <a:solidFill>
+                            <a:schemeClr val="tx1">
+                              <a:lumMod val="95000"/>
+                            </a:schemeClr>
+                          </a:solidFill>
+                        </a:rPr>
+                        <a:t>Google</a:t>
+                      </a:r>
+                    </a:p>
+                  </a:txBody>
+                  <a:tcPr>
+                    <a:solidFill>
+                      <a:schemeClr val="accent1">
+                        <a:alpha val="40000"/>
+                      </a:schemeClr>
+                    </a:solidFill>
+                  </a:tcPr>
+                </a:tc>
+                <a:tc>
+                  <a:txBody>
+                    <a:bodyPr/>
+                    <a:lstStyle/>
+                    <a:p>
+                      <a:r>
+                        <a:rPr lang="en-US" dirty="0">
+                          <a:solidFill>
+                            <a:schemeClr val="tx1">
+                              <a:lumMod val="95000"/>
+                            </a:schemeClr>
+                          </a:solidFill>
+                          <a:hlinkClick r:id="rId5"/>
+                        </a:rPr>
+                        <a:t>Keras</a:t>
+                      </a:r>
+                      <a:r>
+                        <a:rPr lang="en-US" dirty="0">
+                          <a:solidFill>
+                            <a:schemeClr val="tx1">
+                              <a:lumMod val="95000"/>
+                            </a:schemeClr>
+                          </a:solidFill>
+                        </a:rPr>
+                        <a:t>, </a:t>
+                      </a:r>
+                      <a:r>
+                        <a:rPr lang="en-US" dirty="0">
+                          <a:solidFill>
+                            <a:schemeClr val="tx1">
+                              <a:lumMod val="95000"/>
+                            </a:schemeClr>
+                          </a:solidFill>
+                          <a:hlinkClick r:id="rId6"/>
+                        </a:rPr>
+                        <a:t>TFSlim</a:t>
+                      </a:r>
+                      <a:r>
+                        <a:rPr lang="en-US" dirty="0">
+                          <a:solidFill>
+                            <a:schemeClr val="tx1">
+                              <a:lumMod val="95000"/>
+                            </a:schemeClr>
+                          </a:solidFill>
+                        </a:rPr>
+                        <a:t>, </a:t>
+                      </a:r>
+                      <a:r>
+                        <a:rPr lang="en-US" dirty="0">
+                          <a:solidFill>
+                            <a:schemeClr val="tx1">
+                              <a:lumMod val="95000"/>
+                            </a:schemeClr>
+                          </a:solidFill>
+                          <a:hlinkClick r:id="rId7"/>
+                        </a:rPr>
+                        <a:t>TF Estimators</a:t>
+                      </a:r>
+                      <a:r>
+                        <a:rPr lang="en-US" dirty="0">
+                          <a:solidFill>
+                            <a:schemeClr val="tx1">
+                              <a:lumMod val="95000"/>
+                            </a:schemeClr>
+                          </a:solidFill>
+                        </a:rPr>
+                        <a:t>,</a:t>
+                      </a:r>
+                      <a:r>
+                        <a:rPr lang="en-US" baseline="0" dirty="0">
+                          <a:solidFill>
+                            <a:schemeClr val="tx1">
+                              <a:lumMod val="95000"/>
+                            </a:schemeClr>
+                          </a:solidFill>
+                        </a:rPr>
+                        <a:t> </a:t>
+                      </a:r>
+                      <a:r>
+                        <a:rPr lang="en-US" dirty="0" err="1">
+                          <a:solidFill>
+                            <a:schemeClr val="tx1">
+                              <a:lumMod val="95000"/>
+                            </a:schemeClr>
+                          </a:solidFill>
+                          <a:hlinkClick r:id="rId8"/>
+                        </a:rPr>
+                        <a:t>TFLearn</a:t>
+                      </a:r>
+                      <a:r>
+                        <a:rPr lang="en-US" dirty="0">
+                          <a:solidFill>
+                            <a:schemeClr val="tx1">
+                              <a:lumMod val="95000"/>
+                            </a:schemeClr>
+                          </a:solidFill>
+                        </a:rPr>
+                        <a:t>, </a:t>
+                      </a:r>
+                      <a:r>
+                        <a:rPr lang="en-US" dirty="0">
+                          <a:solidFill>
+                            <a:schemeClr val="tx1">
+                              <a:lumMod val="95000"/>
+                            </a:schemeClr>
+                          </a:solidFill>
+                          <a:hlinkClick r:id="rId9"/>
+                        </a:rPr>
+                        <a:t>Sonnet</a:t>
+                      </a:r>
+                      <a:r>
+                        <a:rPr lang="en-US" dirty="0">
+                          <a:solidFill>
+                            <a:schemeClr val="tx1">
+                              <a:lumMod val="95000"/>
+                            </a:schemeClr>
+                          </a:solidFill>
+                        </a:rPr>
+                        <a:t>, </a:t>
+                      </a:r>
+                      <a:r>
+                        <a:rPr lang="is-IS" dirty="0">
+                          <a:solidFill>
+                            <a:schemeClr val="tx1">
+                              <a:lumMod val="95000"/>
+                            </a:schemeClr>
+                          </a:solidFill>
+                          <a:hlinkClick r:id="rId10"/>
+                        </a:rPr>
+                        <a:t>Tensor2Tensor</a:t>
+                      </a:r>
+                      <a:endParaRPr lang="en-US" dirty="0">
+                        <a:solidFill>
+                          <a:schemeClr val="tx1">
+                            <a:lumMod val="95000"/>
+                          </a:schemeClr>
+                        </a:solidFill>
+                      </a:endParaRPr>
+                    </a:p>
+                  </a:txBody>
+                  <a:tcPr>
+                    <a:solidFill>
+                      <a:schemeClr val="accent1">
+                        <a:alpha val="40000"/>
+                      </a:schemeClr>
+                    </a:solidFill>
+                  </a:tcPr>
+                </a:tc>
+                <a:extLst>
+                  <a:ext uri="{0D108BD9-81ED-4DB2-BD59-A6C34878D82A}">
+                    <a16:rowId xmlns:a16="http://schemas.microsoft.com/office/drawing/2014/main" val="10002"/>
+                  </a:ext>
+                </a:extLst>
+              </a:tr>
+              <a:tr h="777240">
+                <a:tc>
+                  <a:txBody>
+                    <a:bodyPr/>
+                    <a:lstStyle/>
+                    <a:p>
+                      <a:r>
+                        <a:rPr lang="en-US" dirty="0">
+                          <a:solidFill>
+                            <a:schemeClr val="tx1">
+                              <a:lumMod val="95000"/>
+                            </a:schemeClr>
+                          </a:solidFill>
+                        </a:rPr>
+                        <a:t>Caffe2</a:t>
+                      </a:r>
+                    </a:p>
+                  </a:txBody>
+                  <a:tcPr>
+                    <a:solidFill>
+                      <a:schemeClr val="accent1">
+                        <a:alpha val="40000"/>
+                      </a:schemeClr>
+                    </a:solidFill>
+                  </a:tcPr>
+                </a:tc>
+                <a:tc>
+                  <a:txBody>
+                    <a:bodyPr/>
+                    <a:lstStyle/>
+                    <a:p>
+                      <a:r>
+                        <a:rPr lang="en-US" dirty="0">
+                          <a:solidFill>
+                            <a:schemeClr val="tx1">
+                              <a:lumMod val="95000"/>
+                            </a:schemeClr>
+                          </a:solidFill>
+                        </a:rPr>
+                        <a:t>Static Computational</a:t>
+                      </a:r>
+                      <a:r>
+                        <a:rPr lang="en-US" baseline="0" dirty="0">
+                          <a:solidFill>
+                            <a:schemeClr val="tx1">
+                              <a:lumMod val="95000"/>
+                            </a:schemeClr>
+                          </a:solidFill>
+                        </a:rPr>
+                        <a:t> Graph</a:t>
+                      </a:r>
+                      <a:endParaRPr lang="en-US" dirty="0">
+                        <a:solidFill>
+                          <a:schemeClr val="tx1">
+                            <a:lumMod val="95000"/>
+                          </a:schemeClr>
+                        </a:solidFill>
+                      </a:endParaRPr>
+                    </a:p>
+                  </a:txBody>
+                  <a:tcPr>
+                    <a:solidFill>
+                      <a:schemeClr val="accent1">
+                        <a:alpha val="40000"/>
+                      </a:schemeClr>
+                    </a:solidFill>
+                  </a:tcPr>
+                </a:tc>
+                <a:tc>
+                  <a:txBody>
+                    <a:bodyPr/>
+                    <a:lstStyle/>
+                    <a:p>
+                      <a:r>
+                        <a:rPr lang="en-US" dirty="0">
+                          <a:solidFill>
+                            <a:schemeClr val="tx1">
+                              <a:lumMod val="95000"/>
+                            </a:schemeClr>
+                          </a:solidFill>
+                        </a:rPr>
+                        <a:t>Facebook</a:t>
+                      </a:r>
+                    </a:p>
+                  </a:txBody>
+                  <a:tcPr>
+                    <a:solidFill>
+                      <a:schemeClr val="accent1">
+                        <a:alpha val="40000"/>
+                      </a:schemeClr>
+                    </a:solidFill>
+                  </a:tcPr>
+                </a:tc>
+                <a:tc>
+                  <a:txBody>
+                    <a:bodyPr/>
+                    <a:lstStyle/>
+                    <a:p>
+                      <a:r>
+                        <a:rPr lang="en-US" dirty="0">
+                          <a:solidFill>
+                            <a:schemeClr val="tx1">
+                              <a:lumMod val="95000"/>
+                            </a:schemeClr>
+                          </a:solidFill>
+                        </a:rPr>
+                        <a:t>Python</a:t>
+                      </a:r>
+                    </a:p>
+                  </a:txBody>
+                  <a:tcPr>
+                    <a:solidFill>
+                      <a:schemeClr val="accent1">
+                        <a:alpha val="40000"/>
+                      </a:schemeClr>
+                    </a:solidFill>
+                  </a:tcPr>
+                </a:tc>
+                <a:extLst>
+                  <a:ext uri="{0D108BD9-81ED-4DB2-BD59-A6C34878D82A}">
+                    <a16:rowId xmlns:a16="http://schemas.microsoft.com/office/drawing/2014/main" val="10003"/>
+                  </a:ext>
+                </a:extLst>
+              </a:tr>
+              <a:tr h="777240">
+                <a:tc>
+                  <a:txBody>
+                    <a:bodyPr/>
+                    <a:lstStyle/>
+                    <a:p>
+                      <a:r>
+                        <a:rPr lang="en-US" dirty="0" err="1">
+                          <a:solidFill>
+                            <a:schemeClr val="tx1">
+                              <a:lumMod val="95000"/>
+                            </a:schemeClr>
+                          </a:solidFill>
+                        </a:rPr>
+                        <a:t>PyTorch</a:t>
+                      </a:r>
+                      <a:endParaRPr lang="en-US" dirty="0">
+                        <a:solidFill>
+                          <a:schemeClr val="tx1">
+                            <a:lumMod val="95000"/>
+                          </a:schemeClr>
+                        </a:solidFill>
+                      </a:endParaRPr>
+                    </a:p>
+                  </a:txBody>
+                  <a:tcPr>
+                    <a:solidFill>
+                      <a:schemeClr val="accent1">
+                        <a:alpha val="40000"/>
+                      </a:schemeClr>
+                    </a:solidFill>
+                  </a:tcPr>
+                </a:tc>
+                <a:tc>
+                  <a:txBody>
+                    <a:bodyPr/>
+                    <a:lstStyle/>
+                    <a:p>
+                      <a:r>
+                        <a:rPr lang="en-US" dirty="0">
+                          <a:solidFill>
+                            <a:schemeClr val="tx1">
+                              <a:lumMod val="95000"/>
+                            </a:schemeClr>
+                          </a:solidFill>
+                        </a:rPr>
+                        <a:t>Dynamic, Define and Run</a:t>
+                      </a:r>
+                    </a:p>
+                  </a:txBody>
+                  <a:tcPr>
+                    <a:solidFill>
+                      <a:schemeClr val="accent1">
+                        <a:alpha val="40000"/>
+                      </a:schemeClr>
+                    </a:solidFill>
+                  </a:tcPr>
+                </a:tc>
+                <a:tc>
+                  <a:txBody>
+                    <a:bodyPr/>
+                    <a:lstStyle/>
+                    <a:p>
+                      <a:r>
+                        <a:rPr lang="en-US" dirty="0">
+                          <a:solidFill>
+                            <a:schemeClr val="tx1">
+                              <a:lumMod val="95000"/>
+                            </a:schemeClr>
+                          </a:solidFill>
+                        </a:rPr>
+                        <a:t>Facebook</a:t>
+                      </a:r>
+                    </a:p>
+                  </a:txBody>
+                  <a:tcPr>
+                    <a:solidFill>
+                      <a:schemeClr val="accent1">
+                        <a:alpha val="40000"/>
+                      </a:schemeClr>
+                    </a:solidFill>
+                  </a:tcPr>
+                </a:tc>
+                <a:tc>
+                  <a:txBody>
+                    <a:bodyPr/>
+                    <a:lstStyle/>
+                    <a:p>
+                      <a:r>
+                        <a:rPr lang="en-US" dirty="0">
+                          <a:solidFill>
+                            <a:schemeClr val="tx1">
+                              <a:lumMod val="95000"/>
+                            </a:schemeClr>
+                          </a:solidFill>
+                        </a:rPr>
+                        <a:t>Python</a:t>
+                      </a:r>
+                    </a:p>
+                  </a:txBody>
+                  <a:tcPr>
+                    <a:solidFill>
+                      <a:schemeClr val="accent1">
+                        <a:alpha val="40000"/>
+                      </a:schemeClr>
+                    </a:solidFill>
+                  </a:tcPr>
+                </a:tc>
+                <a:extLst>
+                  <a:ext uri="{0D108BD9-81ED-4DB2-BD59-A6C34878D82A}">
+                    <a16:rowId xmlns:a16="http://schemas.microsoft.com/office/drawing/2014/main" val="10004"/>
+                  </a:ext>
+                </a:extLst>
+              </a:tr>
+              <a:tr h="777240">
+                <a:tc>
+                  <a:txBody>
+                    <a:bodyPr/>
+                    <a:lstStyle/>
+                    <a:p>
+                      <a:r>
+                        <a:rPr lang="en-US" dirty="0" err="1">
+                          <a:solidFill>
+                            <a:schemeClr val="tx1">
+                              <a:lumMod val="95000"/>
+                            </a:schemeClr>
+                          </a:solidFill>
+                        </a:rPr>
+                        <a:t>MxNet</a:t>
+                      </a:r>
+                      <a:endParaRPr lang="en-US" dirty="0">
+                        <a:solidFill>
+                          <a:schemeClr val="tx1">
+                            <a:lumMod val="95000"/>
+                          </a:schemeClr>
+                        </a:solidFill>
+                      </a:endParaRPr>
+                    </a:p>
+                  </a:txBody>
+                  <a:tcPr>
+                    <a:solidFill>
+                      <a:schemeClr val="accent1">
+                        <a:alpha val="40000"/>
+                      </a:schemeClr>
+                    </a:solidFill>
+                  </a:tcPr>
+                </a:tc>
+                <a:tc>
+                  <a:txBody>
+                    <a:bodyPr/>
+                    <a:lstStyle/>
+                    <a:p>
+                      <a:r>
+                        <a:rPr lang="en-US" dirty="0">
+                          <a:solidFill>
+                            <a:schemeClr val="tx1">
+                              <a:lumMod val="95000"/>
+                            </a:schemeClr>
+                          </a:solidFill>
+                        </a:rPr>
+                        <a:t>Static Computational Graph</a:t>
+                      </a:r>
+                    </a:p>
+                  </a:txBody>
+                  <a:tcPr>
+                    <a:solidFill>
+                      <a:schemeClr val="accent1">
+                        <a:alpha val="40000"/>
+                      </a:schemeClr>
+                    </a:solidFill>
+                  </a:tcPr>
+                </a:tc>
+                <a:tc>
+                  <a:txBody>
+                    <a:bodyPr/>
+                    <a:lstStyle/>
+                    <a:p>
+                      <a:r>
+                        <a:rPr lang="en-US" dirty="0">
+                          <a:solidFill>
+                            <a:schemeClr val="tx1">
+                              <a:lumMod val="95000"/>
+                            </a:schemeClr>
+                          </a:solidFill>
+                        </a:rPr>
+                        <a:t>Apache,</a:t>
+                      </a:r>
+                      <a:r>
+                        <a:rPr lang="en-US" baseline="0" dirty="0">
+                          <a:solidFill>
+                            <a:schemeClr val="tx1">
+                              <a:lumMod val="95000"/>
+                            </a:schemeClr>
+                          </a:solidFill>
+                        </a:rPr>
+                        <a:t> Amazon</a:t>
+                      </a:r>
+                      <a:endParaRPr lang="en-US" dirty="0">
+                        <a:solidFill>
+                          <a:schemeClr val="tx1">
+                            <a:lumMod val="95000"/>
+                          </a:schemeClr>
+                        </a:solidFill>
+                      </a:endParaRPr>
+                    </a:p>
+                  </a:txBody>
+                  <a:tcPr>
+                    <a:solidFill>
+                      <a:schemeClr val="accent1">
+                        <a:alpha val="40000"/>
+                      </a:schemeClr>
+                    </a:solidFill>
+                  </a:tcPr>
+                </a:tc>
+                <a:tc>
+                  <a:txBody>
+                    <a:bodyPr/>
+                    <a:lstStyle/>
+                    <a:p>
+                      <a:r>
+                        <a:rPr lang="en-US" dirty="0">
+                          <a:solidFill>
+                            <a:schemeClr val="tx1">
+                              <a:lumMod val="95000"/>
+                            </a:schemeClr>
+                          </a:solidFill>
+                        </a:rPr>
+                        <a:t>Gluon, </a:t>
+                      </a:r>
+                      <a:r>
+                        <a:rPr lang="en-US" dirty="0" err="1">
+                          <a:solidFill>
+                            <a:schemeClr val="tx1">
+                              <a:lumMod val="95000"/>
+                            </a:schemeClr>
+                          </a:solidFill>
+                        </a:rPr>
+                        <a:t>MxNet</a:t>
+                      </a:r>
+                      <a:endParaRPr lang="en-US" dirty="0">
+                        <a:solidFill>
+                          <a:schemeClr val="tx1">
+                            <a:lumMod val="95000"/>
+                          </a:schemeClr>
+                        </a:solidFill>
+                      </a:endParaRPr>
+                    </a:p>
+                  </a:txBody>
+                  <a:tcPr>
+                    <a:solidFill>
+                      <a:schemeClr val="accent1">
+                        <a:alpha val="40000"/>
+                      </a:schemeClr>
+                    </a:solidFill>
+                  </a:tcPr>
+                </a:tc>
+                <a:extLst>
+                  <a:ext uri="{0D108BD9-81ED-4DB2-BD59-A6C34878D82A}">
+                    <a16:rowId xmlns:a16="http://schemas.microsoft.com/office/drawing/2014/main" val="10005"/>
+                  </a:ext>
+                </a:extLst>
+              </a:tr>
+            </a:tbl>
+          </a:graphicData>
+        </a:graphic>
+      </p:graphicFrame>
+    </p:spTree>
+    <p:extLst>
+      <p:ext uri="{BB962C8B-B14F-4D97-AF65-F5344CB8AC3E}">
+        <p14:creationId xmlns:p14="http://schemas.microsoft.com/office/powerpoint/2010/main" val="3572480722"/>
+      </p:ext>
+    </p:extLst>
+  </p:cSld>
+  <p:clrMapOvr>
+    <a:masterClrMapping/>
+  </p:clrMapOvr>
+  <mc:AlternateContent xmlns:mc="http://schemas.openxmlformats.org/markup-compatibility/2006" xmlns:p14="http://schemas.microsoft.com/office/powerpoint/2010/main">
+    <mc:Choice Requires="p14">
+      <p:transition spd="med" p14:dur="700">
+        <p:fade/>
+      </p:transition>
+    </mc:Choice>
+    <mc:Fallback xmlns="">
+      <p:transition spd="med">
+        <p:fade/>
+      </p:transition>
+    </mc:Fallback>
+  </mc:AlternateContent>
 </p:sld>
 </file>
 

</xml_diff>